<commit_message>
fix formatting issue in executive summary
</commit_message>
<xml_diff>
--- a/Program_Health_Report.pptx
+++ b/Program_Health_Report.pptx
@@ -3197,22 +3197,22 @@
           </a:p>
           <a:p>
             <a:r>
-              <a:t>*   **Critical Delivery Predictability:** Average sprint completion rates are consistently low (~53%), with a notable decline in recent sprints (33-38%), signaling severe challenges in planning and execution.</a:t>
-            </a:r>
-          </a:p>
-          <a:p>
-            <a:r>
-              <a:t>*   **Acute Quality Issues:** Defect density is alarmingly high, consistently exceeding one defect per story, indicating systemic quality control breakdowns and a high potential for rework.</a:t>
-            </a:r>
-          </a:p>
-          <a:p>
-            <a:r>
-              <a:t>*   **Significant Pipeline Bottlenecks:** A large number of items are currently stalled in SIT (23) and UAT (21) phases, creating a substantial backlog and impeding overall release flow.</a:t>
-            </a:r>
-          </a:p>
-          <a:p>
-            <a:r>
-              <a:t>*   **Persistent Resource Overload:** A majority of the development team (4 out of 6 members) is operating significantly above their assumed capacity, contributing to potential burnout and impacting productivity.</a:t>
+              <a:t>*   **Persistent Under-delivery:** The team consistently delivers only 50-60% of committed work, with recent sprints frequently falling below 40%, severely impacting predictability and roadmap execution.</a:t>
+            </a:r>
+          </a:p>
+          <a:p>
+            <a:r>
+              <a:t>*   **Critical Quality Decline:** Defect density is alarmingly high, with recent sprints averaging over one defect per story, indicating significant quality issues and potential for extensive rework.</a:t>
+            </a:r>
+          </a:p>
+          <a:p>
+            <a:r>
+              <a:t>*   **Overloaded Team &amp; Bottlenecks:** Key team members are significantly over-capacity, while a large volume of work is stalled in SIT and UAT environments, indicating severe pipeline blockages and an unsustainable workload.</a:t>
+            </a:r>
+          </a:p>
+          <a:p>
+            <a:r>
+              <a:t>*   **Unmanaged Critical Risks:** A substantial number of high-impact risks, issues, and dependencies remain open and unmitigated, posing significant threats to project timelines and overall stability.</a:t>
             </a:r>
           </a:p>
           <a:p/>
@@ -3223,22 +3223,22 @@
           </a:p>
           <a:p>
             <a:r>
-              <a:t>*   **Unmitigated Strategic Risks:** A critical 81% (17 out of 21) of identified risks remain open and unaddressed, posing substantial threats to project timelines and successful outcomes.</a:t>
-            </a:r>
-          </a:p>
-          <a:p>
-            <a:r>
-              <a:t>*   **Critical Dependency Blockers:** 85% (12 out of 14) of project dependencies are open and unresolved, serving as major impediments across multiple workstreams.</a:t>
-            </a:r>
-          </a:p>
-          <a:p>
-            <a:r>
-              <a:t>*   **Team Burnout and Morale Decline:** Chronic workload imbalance and high pressure due to quality issues increase the risk of team burnout, leading to further drops in productivity and quality.</a:t>
-            </a:r>
-          </a:p>
-          <a:p>
-            <a:r>
-              <a:t>*   **Extended Time-to-Market:** The current backlog in testing and the high defect rate will inevitably extend the time-to-market for new features and critical updates.</a:t>
+              <a:t>*   **High External Dependency Risk:** A vast majority (12 of 14) of identified dependencies are open and unmanaged, representing a critical external blocking factor severely impacting delivery timelines.</a:t>
+            </a:r>
+          </a:p>
+          <a:p>
+            <a:r>
+              <a:t>*   **Team Burnout &amp; Attrition:** Consistent over-capacity for multiple team members combined with the pressure of high defect rates creates a high risk of burnout, reduced morale, and potential key talent attrition.</a:t>
+            </a:r>
+          </a:p>
+          <a:p>
+            <a:r>
+              <a:t>*   **Compromised Product Quality &amp; Rework:** The persistent high defect density through SIT/UAT stages significantly increases the likelihood of critical bugs reaching production, escalating support costs and damaging customer trust.</a:t>
+            </a:r>
+          </a:p>
+          <a:p>
+            <a:r>
+              <a:t>*   **Unpredictable Delivery &amp; Scope Creep:** The lack of consistent velocity and high number of open issues contribute to a highly unpredictable delivery cadence, making accurate forecasting and effective scope management extremely challenging.</a:t>
             </a:r>
           </a:p>
           <a:p/>
@@ -3249,22 +3249,22 @@
           </a:p>
           <a:p>
             <a:r>
-              <a:t>*   **Immediate Scope &amp; Capacity Realignment:** Conduct an urgent review of current sprint commitments and upcoming backlog items, aligning scope with realistic team capacity and quality expectations to improve completion rates.</a:t>
-            </a:r>
-          </a:p>
-          <a:p>
-            <a:r>
-              <a:t>*   **Aggressive RAID Remediation Plan:** Mandate a focused effort to address all open dependencies and high-priority risks, establishing clear ownership, mitigation strategies, and strict timelines for resolution.</a:t>
-            </a:r>
-          </a:p>
-          <a:p>
-            <a:r>
-              <a:t>*   **Implement Quality-at-Source Initiatives:** Introduce targeted interventions to improve quality earlier in the development lifecycle, including enhanced peer reviews, automated testing, and comprehensive defect prevention training.</a:t>
-            </a:r>
-          </a:p>
-          <a:p>
-            <a:r>
-              <a:t>*   **Strategic Resource Rebalancing:** Initiate a thorough review of team assignments and workloads, reallocating resources or temporarily adjusting priorities to alleviate overload and ensure sustainable team performance.</a:t>
+              <a:t>*   **Immediate RAID Prioritization &amp; Mitigation:** Establish an immediate, cross-functional task force to review and actively mitigate all critical open risks, issues, and especially dependencies, with daily tracking and reporting.</a:t>
+            </a:r>
+          </a:p>
+          <a:p>
+            <a:r>
+              <a:t>*   **Re-evaluate Capacity &amp; Workload Balancing:** Conduct an urgent review of team capacity, redistribute workload more equitably, and consider pausing new commitments to stabilize the team and allow for resolution of technical debt.</a:t>
+            </a:r>
+          </a:p>
+          <a:p>
+            <a:r>
+              <a:t>*   **Enhance Quality Gates &amp; Definition of Done:** Implement stricter quality gates upstream (e.g., improved unit testing, peer reviews, shift-left testing) and re-enforce the Definition of Done to reduce defect escape rates into later stages.</a:t>
+            </a:r>
+          </a:p>
+          <a:p>
+            <a:r>
+              <a:t>*   **Right-size Sprint Commitments:** Adjust future sprint commitments to reflect actual historical velocity (e.g., targeting 50-60% of current commitments) to build predictability and enable the team to focus on quality and resolution of current impediments.</a:t>
             </a:r>
           </a:p>
         </p:txBody>
@@ -3324,48 +3324,52 @@
           <a:lstStyle/>
           <a:p>
             <a:r>
-              <a:t>⚠️</a:t>
-            </a:r>
-          </a:p>
-          <a:p>
-            <a:r>
-              <a:t>*   Average completion rate is consistently low (~54%).</a:t>
-            </a:r>
-          </a:p>
-          <a:p>
-            <a:r>
-              <a:t>*   Significant gap between committed and completed points.</a:t>
-            </a:r>
-          </a:p>
-          <a:p>
-            <a:r>
-              <a:t>*   Velocity trend shows high inconsistency and frequent dips.</a:t>
-            </a:r>
-          </a:p>
-          <a:p>
-            <a:r>
-              <a:t>*   Recent SPRINT-10 recorded a notable improvement.</a:t>
-            </a:r>
-          </a:p>
-          <a:p>
-            <a:r>
               <a:t>❌</a:t>
             </a:r>
+          </a:p>
+          <a:p>
+            <a:r>
+              <a:t>*   Significant gap exists between committed and completed points.</a:t>
+            </a:r>
+          </a:p>
+          <a:p>
+            <a:r>
+              <a:t>*   Average completion rate is consistently low, around 55%.</a:t>
+            </a:r>
+          </a:p>
+          <a:p>
+            <a:r>
+              <a:t>*   Completed velocity shows high variability and frequent dips.</a:t>
+            </a:r>
+          </a:p>
+          <a:p>
+            <a:r>
+              <a:t>*   Team struggles with predictability and realistic sprint commitments.</a:t>
+            </a:r>
+          </a:p>
+          <a:p>
+            <a:r>
+              <a:t>❌</a:t>
+            </a:r>
             <a:br/>
             <a:r>
-              <a:t>*   Average sprint completion is 53.6%.</a:t>
+              <a:t>*   Overall low sprint goal completion.</a:t>
             </a:r>
             <a:br/>
             <a:r>
-              <a:t>*   Completion rates vary widely (33% to 74%).</a:t>
+              <a:t>*   Average completion rate is approximately 54%.</a:t>
             </a:r>
             <a:br/>
             <a:r>
-              <a:t>*   Multiple sprints achieve less than 40% completion.</a:t>
+              <a:t>*   Completion rates fluctuate widely (33% to 74%).</a:t>
             </a:r>
             <a:br/>
             <a:r>
-              <a:t>*   Indicates significant challenges in forecasting or delivery.</a:t>
+              <a:t>*   No sprint achieved full goal completion.</a:t>
+            </a:r>
+            <a:br/>
+            <a:r>
+              <a:t>*   Suggests issues with planning, estimation, or delivery.</a:t>
             </a:r>
           </a:p>
         </p:txBody>

</xml_diff>

<commit_message>
Introduced the data analysis agent for project dashboard
</commit_message>
<xml_diff>
--- a/Program_Health_Report.pptx
+++ b/Program_Health_Report.pptx
@@ -3127,7 +3127,7 @@
           <a:lstStyle/>
           <a:p>
             <a:r>
-              <a:t>Executive Summary - Generated by AI on 2025-10-05</a:t>
+              <a:t>Executive Summary - Generated by AI on 2025-10-12</a:t>
             </a:r>
           </a:p>
         </p:txBody>
@@ -3187,84 +3187,137 @@
           <a:lstStyle/>
           <a:p>
             <a:r>
-              <a:t>🔴</a:t>
-            </a:r>
-          </a:p>
-          <a:p>
-            <a:r>
-              <a:t>## Overall Health &amp; Status</a:t>
-            </a:r>
-          </a:p>
-          <a:p>
-            <a:r>
-              <a:t>*   **Persistent Under-delivery:** The team consistently delivers only 50-60% of committed work, with recent sprints frequently falling below 40%, severely impacting predictability and roadmap execution.</a:t>
-            </a:r>
-          </a:p>
-          <a:p>
-            <a:r>
-              <a:t>*   **Critical Quality Decline:** Defect density is alarmingly high, with recent sprints averaging over one defect per story, indicating significant quality issues and potential for extensive rework.</a:t>
-            </a:r>
-          </a:p>
-          <a:p>
-            <a:r>
-              <a:t>*   **Overloaded Team &amp; Bottlenecks:** Key team members are significantly over-capacity, while a large volume of work is stalled in SIT and UAT environments, indicating severe pipeline blockages and an unsustainable workload.</a:t>
-            </a:r>
-          </a:p>
-          <a:p>
-            <a:r>
-              <a:t>*   **Unmanaged Critical Risks:** A substantial number of high-impact risks, issues, and dependencies remain open and unmitigated, posing significant threats to project timelines and overall stability.</a:t>
+              <a:t>Based on the overall health assessment from the various metrics, here are key improvement areas that can be implemented immediately:</a:t>
             </a:r>
           </a:p>
           <a:p/>
           <a:p>
             <a:r>
-              <a:t>## Key Risks and Impediments</a:t>
-            </a:r>
-          </a:p>
-          <a:p>
-            <a:r>
-              <a:t>*   **High External Dependency Risk:** A vast majority (12 of 14) of identified dependencies are open and unmanaged, representing a critical external blocking factor severely impacting delivery timelines.</a:t>
-            </a:r>
-          </a:p>
-          <a:p>
-            <a:r>
-              <a:t>*   **Team Burnout &amp; Attrition:** Consistent over-capacity for multiple team members combined with the pressure of high defect rates creates a high risk of burnout, reduced morale, and potential key talent attrition.</a:t>
-            </a:r>
-          </a:p>
-          <a:p>
-            <a:r>
-              <a:t>*   **Compromised Product Quality &amp; Rework:** The persistent high defect density through SIT/UAT stages significantly increases the likelihood of critical bugs reaching production, escalating support costs and damaging customer trust.</a:t>
-            </a:r>
-          </a:p>
-          <a:p>
-            <a:r>
-              <a:t>*   **Unpredictable Delivery &amp; Scope Creep:** The lack of consistent velocity and high number of open issues contribute to a highly unpredictable delivery cadence, making accurate forecasting and effective scope management extremely challenging.</a:t>
+              <a:t>### Immediate Improvement Areas for Program Health:</a:t>
             </a:r>
           </a:p>
           <a:p/>
           <a:p>
             <a:r>
-              <a:t>## Executive Recommendations</a:t>
-            </a:r>
-          </a:p>
-          <a:p>
-            <a:r>
-              <a:t>*   **Immediate RAID Prioritization &amp; Mitigation:** Establish an immediate, cross-functional task force to review and actively mitigate all critical open risks, issues, and especially dependencies, with daily tracking and reporting.</a:t>
-            </a:r>
-          </a:p>
-          <a:p>
-            <a:r>
-              <a:t>*   **Re-evaluate Capacity &amp; Workload Balancing:** Conduct an urgent review of team capacity, redistribute workload more equitably, and consider pausing new commitments to stabilize the team and allow for resolution of technical debt.</a:t>
-            </a:r>
-          </a:p>
-          <a:p>
-            <a:r>
-              <a:t>*   **Enhance Quality Gates &amp; Definition of Done:** Implement stricter quality gates upstream (e.g., improved unit testing, peer reviews, shift-left testing) and re-enforce the Definition of Done to reduce defect escape rates into later stages.</a:t>
-            </a:r>
-          </a:p>
-          <a:p>
-            <a:r>
-              <a:t>*   **Right-size Sprint Commitments:** Adjust future sprint commitments to reflect actual historical velocity (e.g., targeting 50-60% of current commitments) to build predictability and enable the team to focus on quality and resolution of current impediments.</a:t>
+              <a:t>1.  **Strengthen Sprint Planning and Commitment Reliability:**</a:t>
+            </a:r>
+          </a:p>
+          <a:p>
+            <a:r>
+              <a:t>    *   **Evidence:** Consistently low sprint completion rates (e.g., SPRINT-7 committed 76 points, completed 41; SPRINT-8 committed 50, completed 19) and highly inconsistent velocity (e.g., SPRINT-9 at 12 points vs. SPRINT-10 at 52 points). This indicates issues with realistic planning or execution.</a:t>
+            </a:r>
+          </a:p>
+          <a:p>
+            <a:r>
+              <a:t>    *   **Immediate Action:**</a:t>
+            </a:r>
+          </a:p>
+          <a:p>
+            <a:r>
+              <a:t>        *   **Implement more rigorous story point estimation:** Review past sprint data during planning to improve accuracy. Encourage the team to account for complexity, unknowns, and potential dependencies when estimating.</a:t>
+            </a:r>
+          </a:p>
+          <a:p>
+            <a:r>
+              <a:t>        *   **Refine sprint commitment discussions:** Ensure the team has a shared understanding of what "done" means for each story. Challenge over-commitment and prioritize a realistic, achievable sprint goal.</a:t>
+            </a:r>
+          </a:p>
+          <a:p>
+            <a:r>
+              <a:t>        *   **Conduct daily stand-ups with a focus on blockers:** Ensure that progress is tracked daily and any impediments to completing committed work are identified and addressed immediately.</a:t>
+            </a:r>
+          </a:p>
+          <a:p/>
+          <a:p>
+            <a:r>
+              <a:t>2.  **Shift-Left Quality Assurance to Reduce Defect Leakage:**</a:t>
+            </a:r>
+          </a:p>
+          <a:p>
+            <a:r>
+              <a:t>    *   **Evidence:** High defect density across sprints (e.g., SPRINT-6 and SPRINT-7 show 19 defects for 14 stories each). Crucially, a significant number of defects are found late in the cycle: 23 in SIT, 21 in UAT, and 8 in Production. This indicates defects are not being caught early enough.</a:t>
+            </a:r>
+          </a:p>
+          <a:p>
+            <a:r>
+              <a:t>    *   **Immediate Action:**</a:t>
+            </a:r>
+          </a:p>
+          <a:p>
+            <a:r>
+              <a:t>        *   **Enhance Definition of Done (DoD):** Include robust unit testing, code reviews by peers, and automated static code analysis as mandatory steps before a story is considered complete by developers.</a:t>
+            </a:r>
+          </a:p>
+          <a:p>
+            <a:r>
+              <a:t>        *   **Increase Developer Testing:** Encourage developers to write more comprehensive unit and integration tests, and conduct thorough self-testing before handing over to QA.</a:t>
+            </a:r>
+          </a:p>
+          <a:p>
+            <a:r>
+              <a:t>        *   **Early QA Involvement:** Engage QA engineers earlier in the sprint to review requirements and create test plans, potentially even participating in design discussions to identify potential defect sources.</a:t>
+            </a:r>
+          </a:p>
+          <a:p/>
+          <a:p>
+            <a:r>
+              <a:t>3.  **Optimize Team Workload Distribution and Capacity Utilization:**</a:t>
+            </a:r>
+          </a:p>
+          <a:p>
+            <a:r>
+              <a:t>    *   **Evidence:** Overall team underutilization, with no individual exceeding 70% of their assumed capacity. There's also a significant imbalance, with Fiona (68%) and Bob (61%) having higher loads, while Alice (19%) has a very low utilization.</a:t>
+            </a:r>
+          </a:p>
+          <a:p>
+            <a:r>
+              <a:t>    *   **Immediate Action:**</a:t>
+            </a:r>
+          </a:p>
+          <a:p>
+            <a:r>
+              <a:t>        *   **Investigate Low Utilization:** Conduct one-on-one discussions with individuals showing very low utilization (e.g., Alice) to understand reasons – are there skill gaps, blockers, or insufficient task assignment?</a:t>
+            </a:r>
+          </a:p>
+          <a:p>
+            <a:r>
+              <a:t>        *   **Cross-Training Opportunities:** Identify areas for cross-training within the team to enable more flexible task allocation and reduce reliance on specific individuals for certain types of work.</a:t>
+            </a:r>
+          </a:p>
+          <a:p>
+            <a:r>
+              <a:t>        *   **Transparent Task Allocation:** Use sprint planning and daily stand-ups to openly discuss task assignments and ensure a more balanced distribution of workload, leveraging the higher capacity available across the team.</a:t>
+            </a:r>
+          </a:p>
+          <a:p/>
+          <a:p>
+            <a:r>
+              <a:t>4.  **Proactive Management of RAID Items:**</a:t>
+            </a:r>
+          </a:p>
+          <a:p>
+            <a:r>
+              <a:t>    *   **Evidence:** A considerable number of open RAID items (17 Risks, 12 Dependencies, 9 Issues, 3 Assumptions). While none are currently overdue, these represent potential future roadblocks that can impact sprint velocity and completion if not addressed.</a:t>
+            </a:r>
+          </a:p>
+          <a:p>
+            <a:r>
+              <a:t>    *   **Immediate Action:**</a:t>
+            </a:r>
+          </a:p>
+          <a:p>
+            <a:r>
+              <a:t>        *   **Dedicated RAID Review:** Schedule a dedicated, frequent (e.g., weekly) short meeting to review all open RAID items. Assign clear owners and realistic target dates for mitigation/resolution.</a:t>
+            </a:r>
+          </a:p>
+          <a:p>
+            <a:r>
+              <a:t>        *   **Escalate Blockers Promptly:** Establish a clear escalation path for critical risks, issues, or unresolved dependencies that are impeding sprint progress. Do not let them linger.</a:t>
+            </a:r>
+          </a:p>
+          <a:p>
+            <a:r>
+              <a:t>        *   **Communicate Dependencies:** Ensure that external dependencies are clearly communicated to relevant stakeholders with agreed-upon timelines to prevent them from becoming sprint blockers.</a:t>
             </a:r>
           </a:p>
         </p:txBody>
@@ -3324,52 +3377,12 @@
           <a:lstStyle/>
           <a:p>
             <a:r>
-              <a:t>❌</a:t>
-            </a:r>
-          </a:p>
-          <a:p>
-            <a:r>
-              <a:t>*   Significant gap exists between committed and completed points.</a:t>
-            </a:r>
-          </a:p>
-          <a:p>
-            <a:r>
-              <a:t>*   Average completion rate is consistently low, around 55%.</a:t>
-            </a:r>
-          </a:p>
-          <a:p>
-            <a:r>
-              <a:t>*   Completed velocity shows high variability and frequent dips.</a:t>
-            </a:r>
-          </a:p>
-          <a:p>
-            <a:r>
-              <a:t>*   Team struggles with predictability and realistic sprint commitments.</a:t>
-            </a:r>
-          </a:p>
-          <a:p>
-            <a:r>
-              <a:t>❌</a:t>
-            </a:r>
-            <a:br/>
-            <a:r>
-              <a:t>*   Overall low sprint goal completion.</a:t>
-            </a:r>
-            <a:br/>
-            <a:r>
-              <a:t>*   Average completion rate is approximately 54%.</a:t>
-            </a:r>
-            <a:br/>
-            <a:r>
-              <a:t>*   Completion rates fluctuate widely (33% to 74%).</a:t>
-            </a:r>
-            <a:br/>
-            <a:r>
-              <a:t>*   No sprint achieved full goal completion.</a:t>
-            </a:r>
-            <a:br/>
-            <a:r>
-              <a:t>*   Suggests issues with planning, estimation, or delivery.</a:t>
+              <a:t>No specific AI insight generated for this metric in current conversation.</a:t>
+            </a:r>
+          </a:p>
+          <a:p>
+            <a:r>
+              <a:t>No specific AI insight generated for this metric in current conversation.</a:t>
             </a:r>
           </a:p>
         </p:txBody>

</xml_diff>